<commit_message>
updated figure of goals
</commit_message>
<xml_diff>
--- a/FinalProposal/OutcomeFigure.pptx
+++ b/FinalProposal/OutcomeFigure.pptx
@@ -3095,6 +3095,51 @@
           <a:chExt cx="0" cy="0"/>
         </a:xfrm>
       </p:grpSpPr>
+      <p:cxnSp>
+        <p:nvCxnSpPr>
+          <p:cNvPr id="44" name="Curved Connector 43"/>
+          <p:cNvCxnSpPr>
+            <a:stCxn id="3" idx="3"/>
+            <a:endCxn id="13" idx="1"/>
+          </p:cNvCxnSpPr>
+          <p:nvPr/>
+        </p:nvCxnSpPr>
+        <p:spPr>
+          <a:xfrm>
+            <a:off x="2999840" y="2008955"/>
+            <a:ext cx="679147" cy="1297940"/>
+          </a:xfrm>
+          <a:prstGeom prst="curvedConnector3">
+            <a:avLst/>
+          </a:prstGeom>
+          <a:ln>
+            <a:solidFill>
+              <a:srgbClr val="FF0000"/>
+            </a:solidFill>
+          </a:ln>
+          <a:effectLst>
+            <a:outerShdw blurRad="50800" dist="38100" dir="2700000" algn="tl" rotWithShape="0">
+              <a:prstClr val="black">
+                <a:alpha val="40000"/>
+              </a:prstClr>
+            </a:outerShdw>
+          </a:effectLst>
+        </p:spPr>
+        <p:style>
+          <a:lnRef idx="2">
+            <a:schemeClr val="accent1"/>
+          </a:lnRef>
+          <a:fillRef idx="0">
+            <a:schemeClr val="accent1"/>
+          </a:fillRef>
+          <a:effectRef idx="1">
+            <a:schemeClr val="accent1"/>
+          </a:effectRef>
+          <a:fontRef idx="minor">
+            <a:schemeClr val="tx1"/>
+          </a:fontRef>
+        </p:style>
+      </p:cxnSp>
       <p:sp>
         <p:nvSpPr>
           <p:cNvPr id="2" name="Process 1"/>
@@ -3103,7 +3148,7 @@
         </p:nvSpPr>
         <p:spPr>
           <a:xfrm>
-            <a:off x="438875" y="924517"/>
+            <a:off x="273215" y="924517"/>
             <a:ext cx="2726625" cy="640209"/>
           </a:xfrm>
           <a:prstGeom prst="flowChartProcess">
@@ -3157,7 +3202,7 @@
         </p:nvSpPr>
         <p:spPr>
           <a:xfrm>
-            <a:off x="438875" y="1654223"/>
+            <a:off x="273215" y="1717125"/>
             <a:ext cx="2726625" cy="583660"/>
           </a:xfrm>
           <a:prstGeom prst="flowChartProcess">
@@ -3219,8 +3264,186 @@
         </p:nvSpPr>
         <p:spPr>
           <a:xfrm>
-            <a:off x="3582354" y="397409"/>
-            <a:ext cx="2726625" cy="713880"/>
+            <a:off x="3678986" y="397409"/>
+            <a:ext cx="2201888" cy="713880"/>
+          </a:xfrm>
+          <a:prstGeom prst="flowChartProcess">
+            <a:avLst/>
+          </a:prstGeom>
+          <a:noFill/>
+          <a:ln>
+            <a:solidFill>
+              <a:srgbClr val="008000"/>
+            </a:solidFill>
+          </a:ln>
+          <a:effectLst/>
+        </p:spPr>
+        <p:style>
+          <a:lnRef idx="1">
+            <a:schemeClr val="accent1"/>
+          </a:lnRef>
+          <a:fillRef idx="3">
+            <a:schemeClr val="accent1"/>
+          </a:fillRef>
+          <a:effectRef idx="2">
+            <a:schemeClr val="accent1"/>
+          </a:effectRef>
+          <a:fontRef idx="minor">
+            <a:schemeClr val="lt1"/>
+          </a:fontRef>
+        </p:style>
+        <p:txBody>
+          <a:bodyPr rtlCol="0" anchor="ctr"/>
+          <a:lstStyle/>
+          <a:p>
+            <a:r>
+              <a:rPr lang="en-US" sz="1300" dirty="0" smtClean="0">
+                <a:solidFill>
+                  <a:srgbClr val="000000"/>
+                </a:solidFill>
+                <a:effectLst/>
+                <a:latin typeface="Arial"/>
+                <a:cs typeface="Arial"/>
+              </a:rPr>
+              <a:t>Core biological training</a:t>
+            </a:r>
+          </a:p>
+          <a:p>
+            <a:r>
+              <a:rPr lang="en-US" sz="1300" dirty="0" smtClean="0">
+                <a:solidFill>
+                  <a:srgbClr val="000000"/>
+                </a:solidFill>
+                <a:effectLst/>
+                <a:latin typeface="Arial"/>
+                <a:cs typeface="Arial"/>
+              </a:rPr>
+              <a:t>• Semester long courses</a:t>
+            </a:r>
+          </a:p>
+          <a:p>
+            <a:r>
+              <a:rPr lang="en-US" sz="1300" dirty="0" smtClean="0">
+                <a:solidFill>
+                  <a:srgbClr val="000000"/>
+                </a:solidFill>
+                <a:effectLst/>
+                <a:latin typeface="Arial"/>
+                <a:cs typeface="Arial"/>
+              </a:rPr>
+              <a:t>• Field courses</a:t>
+            </a:r>
+            <a:endParaRPr lang="en-US" sz="1300" dirty="0">
+              <a:solidFill>
+                <a:srgbClr val="000000"/>
+              </a:solidFill>
+              <a:effectLst/>
+              <a:latin typeface="Arial"/>
+              <a:cs typeface="Arial"/>
+            </a:endParaRPr>
+          </a:p>
+        </p:txBody>
+      </p:sp>
+      <p:cxnSp>
+        <p:nvCxnSpPr>
+          <p:cNvPr id="7" name="Curved Connector 6"/>
+          <p:cNvCxnSpPr>
+            <a:stCxn id="2" idx="3"/>
+            <a:endCxn id="5" idx="1"/>
+          </p:cNvCxnSpPr>
+          <p:nvPr/>
+        </p:nvCxnSpPr>
+        <p:spPr>
+          <a:xfrm flipV="1">
+            <a:off x="2999840" y="754349"/>
+            <a:ext cx="679146" cy="490273"/>
+          </a:xfrm>
+          <a:prstGeom prst="curvedConnector3">
+            <a:avLst/>
+          </a:prstGeom>
+          <a:ln>
+            <a:solidFill>
+              <a:srgbClr val="008000"/>
+            </a:solidFill>
+          </a:ln>
+          <a:effectLst>
+            <a:outerShdw blurRad="50800" dist="38100" dir="2700000" algn="tl" rotWithShape="0">
+              <a:prstClr val="black">
+                <a:alpha val="40000"/>
+              </a:prstClr>
+            </a:outerShdw>
+          </a:effectLst>
+        </p:spPr>
+        <p:style>
+          <a:lnRef idx="2">
+            <a:schemeClr val="accent1"/>
+          </a:lnRef>
+          <a:fillRef idx="0">
+            <a:schemeClr val="accent1"/>
+          </a:fillRef>
+          <a:effectRef idx="1">
+            <a:schemeClr val="accent1"/>
+          </a:effectRef>
+          <a:fontRef idx="minor">
+            <a:schemeClr val="tx1"/>
+          </a:fontRef>
+        </p:style>
+      </p:cxnSp>
+      <p:cxnSp>
+        <p:nvCxnSpPr>
+          <p:cNvPr id="9" name="Curved Connector 8"/>
+          <p:cNvCxnSpPr>
+            <a:stCxn id="3" idx="3"/>
+            <a:endCxn id="12" idx="1"/>
+          </p:cNvCxnSpPr>
+          <p:nvPr/>
+        </p:nvCxnSpPr>
+        <p:spPr>
+          <a:xfrm>
+            <a:off x="2999840" y="2008955"/>
+            <a:ext cx="679146" cy="438329"/>
+          </a:xfrm>
+          <a:prstGeom prst="curvedConnector3">
+            <a:avLst/>
+          </a:prstGeom>
+          <a:ln>
+            <a:solidFill>
+              <a:srgbClr val="660066"/>
+            </a:solidFill>
+          </a:ln>
+          <a:effectLst>
+            <a:outerShdw blurRad="50800" dist="38100" dir="2700000" algn="tl" rotWithShape="0">
+              <a:prstClr val="black">
+                <a:alpha val="40000"/>
+              </a:prstClr>
+            </a:outerShdw>
+          </a:effectLst>
+        </p:spPr>
+        <p:style>
+          <a:lnRef idx="2">
+            <a:schemeClr val="accent1"/>
+          </a:lnRef>
+          <a:fillRef idx="0">
+            <a:schemeClr val="accent1"/>
+          </a:fillRef>
+          <a:effectRef idx="1">
+            <a:schemeClr val="accent1"/>
+          </a:effectRef>
+          <a:fontRef idx="minor">
+            <a:schemeClr val="tx1"/>
+          </a:fontRef>
+        </p:style>
+      </p:cxnSp>
+      <p:sp>
+        <p:nvSpPr>
+          <p:cNvPr id="17" name="Process 16"/>
+          <p:cNvSpPr/>
+          <p:nvPr/>
+        </p:nvSpPr>
+        <p:spPr>
+          <a:xfrm>
+            <a:off x="273215" y="4196944"/>
+            <a:ext cx="2726625" cy="526331"/>
           </a:xfrm>
           <a:prstGeom prst="flowChartProcess">
             <a:avLst/>
@@ -3260,7 +3483,193 @@
                 <a:latin typeface="Arial"/>
                 <a:cs typeface="Arial"/>
               </a:rPr>
-              <a:t>Core biological training</a:t>
+              <a:t>Lack of synergy between areas of study</a:t>
+            </a:r>
+            <a:endParaRPr lang="en-US" sz="1300" dirty="0">
+              <a:solidFill>
+                <a:srgbClr val="000000"/>
+              </a:solidFill>
+              <a:effectLst/>
+              <a:latin typeface="Arial"/>
+              <a:cs typeface="Arial"/>
+            </a:endParaRPr>
+          </a:p>
+        </p:txBody>
+      </p:sp>
+      <p:sp>
+        <p:nvSpPr>
+          <p:cNvPr id="18" name="Process 17"/>
+          <p:cNvSpPr/>
+          <p:nvPr/>
+        </p:nvSpPr>
+        <p:spPr>
+          <a:xfrm>
+            <a:off x="273215" y="2563218"/>
+            <a:ext cx="2726625" cy="647732"/>
+          </a:xfrm>
+          <a:prstGeom prst="flowChartProcess">
+            <a:avLst/>
+          </a:prstGeom>
+          <a:noFill/>
+          <a:ln>
+            <a:solidFill>
+              <a:schemeClr val="tx1"/>
+            </a:solidFill>
+          </a:ln>
+          <a:effectLst/>
+        </p:spPr>
+        <p:style>
+          <a:lnRef idx="1">
+            <a:schemeClr val="accent1"/>
+          </a:lnRef>
+          <a:fillRef idx="3">
+            <a:schemeClr val="accent1"/>
+          </a:fillRef>
+          <a:effectRef idx="2">
+            <a:schemeClr val="accent1"/>
+          </a:effectRef>
+          <a:fontRef idx="minor">
+            <a:schemeClr val="lt1"/>
+          </a:fontRef>
+        </p:style>
+        <p:txBody>
+          <a:bodyPr rtlCol="0" anchor="ctr"/>
+          <a:lstStyle/>
+          <a:p>
+            <a:r>
+              <a:rPr lang="en-US" sz="1300" dirty="0" smtClean="0">
+                <a:solidFill>
+                  <a:srgbClr val="000000"/>
+                </a:solidFill>
+                <a:effectLst/>
+                <a:latin typeface="Arial"/>
+                <a:cs typeface="Arial"/>
+              </a:rPr>
+              <a:t>Lack of training in new tools and technologies</a:t>
+            </a:r>
+            <a:endParaRPr lang="en-US" sz="1300" dirty="0">
+              <a:solidFill>
+                <a:srgbClr val="000000"/>
+              </a:solidFill>
+              <a:effectLst/>
+              <a:latin typeface="Arial"/>
+              <a:cs typeface="Arial"/>
+            </a:endParaRPr>
+          </a:p>
+        </p:txBody>
+      </p:sp>
+      <p:sp>
+        <p:nvSpPr>
+          <p:cNvPr id="23" name="Process 22"/>
+          <p:cNvSpPr/>
+          <p:nvPr/>
+        </p:nvSpPr>
+        <p:spPr>
+          <a:xfrm>
+            <a:off x="273215" y="3308444"/>
+            <a:ext cx="2726625" cy="647732"/>
+          </a:xfrm>
+          <a:prstGeom prst="flowChartProcess">
+            <a:avLst/>
+          </a:prstGeom>
+          <a:noFill/>
+          <a:ln>
+            <a:solidFill>
+              <a:schemeClr val="tx1"/>
+            </a:solidFill>
+          </a:ln>
+          <a:effectLst/>
+        </p:spPr>
+        <p:style>
+          <a:lnRef idx="1">
+            <a:schemeClr val="accent1"/>
+          </a:lnRef>
+          <a:fillRef idx="3">
+            <a:schemeClr val="accent1"/>
+          </a:fillRef>
+          <a:effectRef idx="2">
+            <a:schemeClr val="accent1"/>
+          </a:effectRef>
+          <a:fontRef idx="minor">
+            <a:schemeClr val="lt1"/>
+          </a:fontRef>
+        </p:style>
+        <p:txBody>
+          <a:bodyPr rtlCol="0" anchor="ctr"/>
+          <a:lstStyle/>
+          <a:p>
+            <a:r>
+              <a:rPr lang="en-US" sz="1300" dirty="0" smtClean="0">
+                <a:solidFill>
+                  <a:srgbClr val="000000"/>
+                </a:solidFill>
+                <a:effectLst/>
+                <a:latin typeface="Arial"/>
+                <a:cs typeface="Arial"/>
+              </a:rPr>
+              <a:t>Lack of diversity among graduate students</a:t>
+            </a:r>
+            <a:endParaRPr lang="en-US" sz="1300" dirty="0">
+              <a:solidFill>
+                <a:srgbClr val="000000"/>
+              </a:solidFill>
+              <a:effectLst/>
+              <a:latin typeface="Arial"/>
+              <a:cs typeface="Arial"/>
+            </a:endParaRPr>
+          </a:p>
+        </p:txBody>
+      </p:sp>
+      <p:sp>
+        <p:nvSpPr>
+          <p:cNvPr id="24" name="Process 23"/>
+          <p:cNvSpPr/>
+          <p:nvPr/>
+        </p:nvSpPr>
+        <p:spPr>
+          <a:xfrm>
+            <a:off x="3678986" y="1272896"/>
+            <a:ext cx="2201888" cy="583660"/>
+          </a:xfrm>
+          <a:prstGeom prst="flowChartProcess">
+            <a:avLst/>
+          </a:prstGeom>
+          <a:noFill/>
+          <a:ln>
+            <a:solidFill>
+              <a:srgbClr val="3366FF"/>
+            </a:solidFill>
+          </a:ln>
+          <a:effectLst/>
+        </p:spPr>
+        <p:style>
+          <a:lnRef idx="1">
+            <a:schemeClr val="accent1"/>
+          </a:lnRef>
+          <a:fillRef idx="3">
+            <a:schemeClr val="accent1"/>
+          </a:fillRef>
+          <a:effectRef idx="2">
+            <a:schemeClr val="accent1"/>
+          </a:effectRef>
+          <a:fontRef idx="minor">
+            <a:schemeClr val="lt1"/>
+          </a:fontRef>
+        </p:style>
+        <p:txBody>
+          <a:bodyPr rtlCol="0" anchor="ctr"/>
+          <a:lstStyle/>
+          <a:p>
+            <a:r>
+              <a:rPr lang="en-US" sz="1300" dirty="0" smtClean="0">
+                <a:solidFill>
+                  <a:srgbClr val="000000"/>
+                </a:solidFill>
+                <a:effectLst/>
+                <a:latin typeface="Arial"/>
+                <a:cs typeface="Arial"/>
+              </a:rPr>
+              <a:t>Technology training</a:t>
             </a:r>
           </a:p>
           <a:p>
@@ -3286,7 +3695,7 @@
                 <a:latin typeface="Arial"/>
                 <a:cs typeface="Arial"/>
               </a:rPr>
-              <a:t>• Field courses</a:t>
+              <a:t>• Workshops</a:t>
             </a:r>
             <a:endParaRPr lang="en-US" sz="1300" dirty="0">
               <a:solidFill>
@@ -3301,20 +3710,724 @@
       </p:sp>
       <p:cxnSp>
         <p:nvCxnSpPr>
-          <p:cNvPr id="7" name="Curved Connector 6"/>
+          <p:cNvPr id="27" name="Curved Connector 26"/>
           <p:cNvCxnSpPr>
             <a:stCxn id="2" idx="3"/>
-            <a:endCxn id="5" idx="1"/>
+            <a:endCxn id="24" idx="1"/>
           </p:cNvCxnSpPr>
           <p:nvPr/>
         </p:nvCxnSpPr>
         <p:spPr>
-          <a:xfrm flipV="1">
-            <a:off x="3165500" y="754349"/>
-            <a:ext cx="416854" cy="490273"/>
+          <a:xfrm>
+            <a:off x="2999840" y="1244622"/>
+            <a:ext cx="679146" cy="320104"/>
           </a:xfrm>
           <a:prstGeom prst="curvedConnector3">
             <a:avLst/>
+          </a:prstGeom>
+          <a:ln>
+            <a:solidFill>
+              <a:srgbClr val="3366FF"/>
+            </a:solidFill>
+          </a:ln>
+          <a:effectLst>
+            <a:outerShdw blurRad="50800" dist="38100" dir="2700000" algn="tl" rotWithShape="0">
+              <a:prstClr val="black">
+                <a:alpha val="40000"/>
+              </a:prstClr>
+            </a:outerShdw>
+          </a:effectLst>
+        </p:spPr>
+        <p:style>
+          <a:lnRef idx="2">
+            <a:schemeClr val="accent1"/>
+          </a:lnRef>
+          <a:fillRef idx="0">
+            <a:schemeClr val="accent1"/>
+          </a:fillRef>
+          <a:effectRef idx="1">
+            <a:schemeClr val="accent1"/>
+          </a:effectRef>
+          <a:fontRef idx="minor">
+            <a:schemeClr val="tx1"/>
+          </a:fontRef>
+        </p:style>
+      </p:cxnSp>
+      <p:sp>
+        <p:nvSpPr>
+          <p:cNvPr id="12" name="Process 11"/>
+          <p:cNvSpPr/>
+          <p:nvPr/>
+        </p:nvSpPr>
+        <p:spPr>
+          <a:xfrm>
+            <a:off x="3678986" y="2008955"/>
+            <a:ext cx="2201888" cy="876657"/>
+          </a:xfrm>
+          <a:prstGeom prst="flowChartProcess">
+            <a:avLst/>
+          </a:prstGeom>
+          <a:noFill/>
+          <a:ln>
+            <a:solidFill>
+              <a:srgbClr val="660066"/>
+            </a:solidFill>
+          </a:ln>
+          <a:effectLst/>
+        </p:spPr>
+        <p:style>
+          <a:lnRef idx="1">
+            <a:schemeClr val="accent1"/>
+          </a:lnRef>
+          <a:fillRef idx="3">
+            <a:schemeClr val="accent1"/>
+          </a:fillRef>
+          <a:effectRef idx="2">
+            <a:schemeClr val="accent1"/>
+          </a:effectRef>
+          <a:fontRef idx="minor">
+            <a:schemeClr val="lt1"/>
+          </a:fontRef>
+        </p:style>
+        <p:txBody>
+          <a:bodyPr rtlCol="0" anchor="ctr"/>
+          <a:lstStyle/>
+          <a:p>
+            <a:r>
+              <a:rPr lang="en-US" sz="1300" dirty="0" smtClean="0">
+                <a:solidFill>
+                  <a:srgbClr val="000000"/>
+                </a:solidFill>
+                <a:effectLst/>
+                <a:latin typeface="Arial"/>
+                <a:cs typeface="Arial"/>
+              </a:rPr>
+              <a:t>Leadership / management / communication</a:t>
+            </a:r>
+            <a:endParaRPr lang="en-US" sz="1300" dirty="0" smtClean="0">
+              <a:solidFill>
+                <a:srgbClr val="000000"/>
+              </a:solidFill>
+              <a:effectLst/>
+              <a:latin typeface="Arial"/>
+              <a:cs typeface="Arial"/>
+            </a:endParaRPr>
+          </a:p>
+          <a:p>
+            <a:r>
+              <a:rPr lang="en-US" sz="1300" dirty="0" smtClean="0">
+                <a:solidFill>
+                  <a:srgbClr val="000000"/>
+                </a:solidFill>
+                <a:effectLst/>
+                <a:latin typeface="Arial"/>
+                <a:cs typeface="Arial"/>
+              </a:rPr>
+              <a:t>• Semester long courses</a:t>
+            </a:r>
+          </a:p>
+          <a:p>
+            <a:r>
+              <a:rPr lang="en-US" sz="1300" dirty="0" smtClean="0">
+                <a:solidFill>
+                  <a:srgbClr val="000000"/>
+                </a:solidFill>
+                <a:effectLst/>
+                <a:latin typeface="Arial"/>
+                <a:cs typeface="Arial"/>
+              </a:rPr>
+              <a:t>• Workshops</a:t>
+            </a:r>
+            <a:endParaRPr lang="en-US" sz="1300" dirty="0">
+              <a:solidFill>
+                <a:srgbClr val="000000"/>
+              </a:solidFill>
+              <a:effectLst/>
+              <a:latin typeface="Arial"/>
+              <a:cs typeface="Arial"/>
+            </a:endParaRPr>
+          </a:p>
+        </p:txBody>
+      </p:sp>
+      <p:sp>
+        <p:nvSpPr>
+          <p:cNvPr id="13" name="Process 12"/>
+          <p:cNvSpPr/>
+          <p:nvPr/>
+        </p:nvSpPr>
+        <p:spPr>
+          <a:xfrm>
+            <a:off x="3678987" y="3079520"/>
+            <a:ext cx="2201888" cy="454750"/>
+          </a:xfrm>
+          <a:prstGeom prst="flowChartProcess">
+            <a:avLst/>
+          </a:prstGeom>
+          <a:noFill/>
+          <a:ln>
+            <a:solidFill>
+              <a:srgbClr val="FF0000"/>
+            </a:solidFill>
+          </a:ln>
+          <a:effectLst/>
+        </p:spPr>
+        <p:style>
+          <a:lnRef idx="1">
+            <a:schemeClr val="accent1"/>
+          </a:lnRef>
+          <a:fillRef idx="3">
+            <a:schemeClr val="accent1"/>
+          </a:fillRef>
+          <a:effectRef idx="2">
+            <a:schemeClr val="accent1"/>
+          </a:effectRef>
+          <a:fontRef idx="minor">
+            <a:schemeClr val="lt1"/>
+          </a:fontRef>
+        </p:style>
+        <p:txBody>
+          <a:bodyPr rtlCol="0" anchor="ctr"/>
+          <a:lstStyle/>
+          <a:p>
+            <a:pPr algn="ctr"/>
+            <a:r>
+              <a:rPr lang="en-US" sz="1300" dirty="0" smtClean="0">
+                <a:solidFill>
+                  <a:srgbClr val="000000"/>
+                </a:solidFill>
+                <a:effectLst/>
+                <a:latin typeface="Arial"/>
+                <a:cs typeface="Arial"/>
+              </a:rPr>
+              <a:t>Internships</a:t>
+            </a:r>
+            <a:endParaRPr lang="en-US" sz="1300" dirty="0">
+              <a:solidFill>
+                <a:srgbClr val="000000"/>
+              </a:solidFill>
+              <a:effectLst/>
+              <a:latin typeface="Arial"/>
+              <a:cs typeface="Arial"/>
+            </a:endParaRPr>
+          </a:p>
+        </p:txBody>
+      </p:sp>
+      <p:sp>
+        <p:nvSpPr>
+          <p:cNvPr id="14" name="Process 13"/>
+          <p:cNvSpPr/>
+          <p:nvPr/>
+        </p:nvSpPr>
+        <p:spPr>
+          <a:xfrm>
+            <a:off x="3678987" y="3789071"/>
+            <a:ext cx="2201888" cy="407873"/>
+          </a:xfrm>
+          <a:prstGeom prst="flowChartProcess">
+            <a:avLst/>
+          </a:prstGeom>
+          <a:noFill/>
+          <a:ln>
+            <a:solidFill>
+              <a:schemeClr val="tx1"/>
+            </a:solidFill>
+          </a:ln>
+          <a:effectLst/>
+        </p:spPr>
+        <p:style>
+          <a:lnRef idx="1">
+            <a:schemeClr val="accent1"/>
+          </a:lnRef>
+          <a:fillRef idx="3">
+            <a:schemeClr val="accent1"/>
+          </a:fillRef>
+          <a:effectRef idx="2">
+            <a:schemeClr val="accent1"/>
+          </a:effectRef>
+          <a:fontRef idx="minor">
+            <a:schemeClr val="lt1"/>
+          </a:fontRef>
+        </p:style>
+        <p:txBody>
+          <a:bodyPr rtlCol="0" anchor="ctr"/>
+          <a:lstStyle/>
+          <a:p>
+            <a:pPr algn="ctr"/>
+            <a:r>
+              <a:rPr lang="en-US" sz="1300" dirty="0" smtClean="0">
+                <a:solidFill>
+                  <a:srgbClr val="000000"/>
+                </a:solidFill>
+                <a:effectLst/>
+                <a:latin typeface="Arial"/>
+                <a:cs typeface="Arial"/>
+              </a:rPr>
+              <a:t>Outreach</a:t>
+            </a:r>
+            <a:endParaRPr lang="en-US" sz="1300" dirty="0">
+              <a:solidFill>
+                <a:srgbClr val="000000"/>
+              </a:solidFill>
+              <a:effectLst/>
+              <a:latin typeface="Arial"/>
+              <a:cs typeface="Arial"/>
+            </a:endParaRPr>
+          </a:p>
+        </p:txBody>
+      </p:sp>
+      <p:sp>
+        <p:nvSpPr>
+          <p:cNvPr id="16" name="Process 15"/>
+          <p:cNvSpPr/>
+          <p:nvPr/>
+        </p:nvSpPr>
+        <p:spPr>
+          <a:xfrm>
+            <a:off x="3678986" y="4399971"/>
+            <a:ext cx="2201889" cy="407873"/>
+          </a:xfrm>
+          <a:prstGeom prst="flowChartProcess">
+            <a:avLst/>
+          </a:prstGeom>
+          <a:noFill/>
+          <a:ln>
+            <a:solidFill>
+              <a:schemeClr val="tx1"/>
+            </a:solidFill>
+          </a:ln>
+          <a:effectLst/>
+        </p:spPr>
+        <p:style>
+          <a:lnRef idx="1">
+            <a:schemeClr val="accent1"/>
+          </a:lnRef>
+          <a:fillRef idx="3">
+            <a:schemeClr val="accent1"/>
+          </a:fillRef>
+          <a:effectRef idx="2">
+            <a:schemeClr val="accent1"/>
+          </a:effectRef>
+          <a:fontRef idx="minor">
+            <a:schemeClr val="lt1"/>
+          </a:fontRef>
+        </p:style>
+        <p:txBody>
+          <a:bodyPr rtlCol="0" anchor="ctr"/>
+          <a:lstStyle/>
+          <a:p>
+            <a:pPr algn="ctr"/>
+            <a:r>
+              <a:rPr lang="en-US" sz="1300" dirty="0" smtClean="0">
+                <a:solidFill>
+                  <a:srgbClr val="000000"/>
+                </a:solidFill>
+                <a:effectLst/>
+                <a:latin typeface="Arial"/>
+                <a:cs typeface="Arial"/>
+              </a:rPr>
+              <a:t>Cross-disciplinary committees</a:t>
+            </a:r>
+            <a:endParaRPr lang="en-US" sz="1300" dirty="0">
+              <a:solidFill>
+                <a:srgbClr val="000000"/>
+              </a:solidFill>
+              <a:effectLst/>
+              <a:latin typeface="Arial"/>
+              <a:cs typeface="Arial"/>
+            </a:endParaRPr>
+          </a:p>
+        </p:txBody>
+      </p:sp>
+      <p:sp>
+        <p:nvSpPr>
+          <p:cNvPr id="20" name="Process 19"/>
+          <p:cNvSpPr/>
+          <p:nvPr/>
+        </p:nvSpPr>
+        <p:spPr>
+          <a:xfrm>
+            <a:off x="6417375" y="797973"/>
+            <a:ext cx="2321107" cy="407873"/>
+          </a:xfrm>
+          <a:prstGeom prst="flowChartProcess">
+            <a:avLst/>
+          </a:prstGeom>
+          <a:noFill/>
+          <a:ln>
+            <a:solidFill>
+              <a:schemeClr val="tx1"/>
+            </a:solidFill>
+          </a:ln>
+          <a:effectLst/>
+        </p:spPr>
+        <p:style>
+          <a:lnRef idx="1">
+            <a:schemeClr val="accent1"/>
+          </a:lnRef>
+          <a:fillRef idx="3">
+            <a:schemeClr val="accent1"/>
+          </a:fillRef>
+          <a:effectRef idx="2">
+            <a:schemeClr val="accent1"/>
+          </a:effectRef>
+          <a:fontRef idx="minor">
+            <a:schemeClr val="lt1"/>
+          </a:fontRef>
+        </p:style>
+        <p:txBody>
+          <a:bodyPr rtlCol="0" anchor="ctr"/>
+          <a:lstStyle/>
+          <a:p>
+            <a:r>
+              <a:rPr lang="en-US" sz="1300" dirty="0" smtClean="0">
+                <a:solidFill>
+                  <a:srgbClr val="000000"/>
+                </a:solidFill>
+                <a:effectLst/>
+                <a:latin typeface="Arial"/>
+                <a:cs typeface="Arial"/>
+              </a:rPr>
+              <a:t>Trainee research</a:t>
+            </a:r>
+            <a:endParaRPr lang="en-US" sz="1300" dirty="0">
+              <a:solidFill>
+                <a:srgbClr val="000000"/>
+              </a:solidFill>
+              <a:effectLst/>
+              <a:latin typeface="Arial"/>
+              <a:cs typeface="Arial"/>
+            </a:endParaRPr>
+          </a:p>
+        </p:txBody>
+      </p:sp>
+      <p:sp>
+        <p:nvSpPr>
+          <p:cNvPr id="21" name="Process 20"/>
+          <p:cNvSpPr/>
+          <p:nvPr/>
+        </p:nvSpPr>
+        <p:spPr>
+          <a:xfrm>
+            <a:off x="6417375" y="1467772"/>
+            <a:ext cx="2321107" cy="407873"/>
+          </a:xfrm>
+          <a:prstGeom prst="flowChartProcess">
+            <a:avLst/>
+          </a:prstGeom>
+          <a:noFill/>
+          <a:ln>
+            <a:solidFill>
+              <a:schemeClr val="tx1"/>
+            </a:solidFill>
+          </a:ln>
+          <a:effectLst/>
+        </p:spPr>
+        <p:style>
+          <a:lnRef idx="1">
+            <a:schemeClr val="accent1"/>
+          </a:lnRef>
+          <a:fillRef idx="3">
+            <a:schemeClr val="accent1"/>
+          </a:fillRef>
+          <a:effectRef idx="2">
+            <a:schemeClr val="accent1"/>
+          </a:effectRef>
+          <a:fontRef idx="minor">
+            <a:schemeClr val="lt1"/>
+          </a:fontRef>
+        </p:style>
+        <p:txBody>
+          <a:bodyPr rtlCol="0" anchor="ctr"/>
+          <a:lstStyle/>
+          <a:p>
+            <a:r>
+              <a:rPr lang="en-US" sz="1300" dirty="0" smtClean="0">
+                <a:solidFill>
+                  <a:srgbClr val="000000"/>
+                </a:solidFill>
+                <a:effectLst/>
+                <a:latin typeface="Arial"/>
+                <a:cs typeface="Arial"/>
+              </a:rPr>
+              <a:t>Trainee placement</a:t>
+            </a:r>
+            <a:endParaRPr lang="en-US" sz="1300" dirty="0">
+              <a:solidFill>
+                <a:srgbClr val="000000"/>
+              </a:solidFill>
+              <a:effectLst/>
+              <a:latin typeface="Arial"/>
+              <a:cs typeface="Arial"/>
+            </a:endParaRPr>
+          </a:p>
+        </p:txBody>
+      </p:sp>
+      <p:sp>
+        <p:nvSpPr>
+          <p:cNvPr id="22" name="Process 21"/>
+          <p:cNvSpPr/>
+          <p:nvPr/>
+        </p:nvSpPr>
+        <p:spPr>
+          <a:xfrm>
+            <a:off x="6417375" y="2798428"/>
+            <a:ext cx="2321107" cy="407873"/>
+          </a:xfrm>
+          <a:prstGeom prst="flowChartProcess">
+            <a:avLst/>
+          </a:prstGeom>
+          <a:noFill/>
+          <a:ln>
+            <a:solidFill>
+              <a:schemeClr val="tx1"/>
+            </a:solidFill>
+          </a:ln>
+          <a:effectLst/>
+        </p:spPr>
+        <p:style>
+          <a:lnRef idx="1">
+            <a:schemeClr val="accent1"/>
+          </a:lnRef>
+          <a:fillRef idx="3">
+            <a:schemeClr val="accent1"/>
+          </a:fillRef>
+          <a:effectRef idx="2">
+            <a:schemeClr val="accent1"/>
+          </a:effectRef>
+          <a:fontRef idx="minor">
+            <a:schemeClr val="lt1"/>
+          </a:fontRef>
+        </p:style>
+        <p:txBody>
+          <a:bodyPr rtlCol="0" anchor="ctr"/>
+          <a:lstStyle/>
+          <a:p>
+            <a:r>
+              <a:rPr lang="en-US" sz="1300" dirty="0" smtClean="0">
+                <a:solidFill>
+                  <a:srgbClr val="000000"/>
+                </a:solidFill>
+                <a:effectLst/>
+                <a:latin typeface="Arial"/>
+                <a:cs typeface="Arial"/>
+              </a:rPr>
+              <a:t>Prototype training model and cultural change</a:t>
+            </a:r>
+            <a:endParaRPr lang="en-US" sz="1300" dirty="0">
+              <a:solidFill>
+                <a:srgbClr val="000000"/>
+              </a:solidFill>
+              <a:effectLst/>
+              <a:latin typeface="Arial"/>
+              <a:cs typeface="Arial"/>
+            </a:endParaRPr>
+          </a:p>
+        </p:txBody>
+      </p:sp>
+      <p:sp>
+        <p:nvSpPr>
+          <p:cNvPr id="25" name="Process 24"/>
+          <p:cNvSpPr/>
+          <p:nvPr/>
+        </p:nvSpPr>
+        <p:spPr>
+          <a:xfrm>
+            <a:off x="6417375" y="4196944"/>
+            <a:ext cx="2321107" cy="407873"/>
+          </a:xfrm>
+          <a:prstGeom prst="flowChartProcess">
+            <a:avLst/>
+          </a:prstGeom>
+          <a:noFill/>
+          <a:ln>
+            <a:solidFill>
+              <a:schemeClr val="tx1"/>
+            </a:solidFill>
+          </a:ln>
+          <a:effectLst/>
+        </p:spPr>
+        <p:style>
+          <a:lnRef idx="1">
+            <a:schemeClr val="accent1"/>
+          </a:lnRef>
+          <a:fillRef idx="3">
+            <a:schemeClr val="accent1"/>
+          </a:fillRef>
+          <a:effectRef idx="2">
+            <a:schemeClr val="accent1"/>
+          </a:effectRef>
+          <a:fontRef idx="minor">
+            <a:schemeClr val="lt1"/>
+          </a:fontRef>
+        </p:style>
+        <p:txBody>
+          <a:bodyPr rtlCol="0" anchor="ctr"/>
+          <a:lstStyle/>
+          <a:p>
+            <a:r>
+              <a:rPr lang="en-US" sz="1300" dirty="0" smtClean="0">
+                <a:solidFill>
+                  <a:srgbClr val="000000"/>
+                </a:solidFill>
+                <a:effectLst/>
+                <a:latin typeface="Arial"/>
+                <a:cs typeface="Arial"/>
+              </a:rPr>
+              <a:t>Synergy in research</a:t>
+            </a:r>
+            <a:endParaRPr lang="en-US" sz="1300" dirty="0">
+              <a:solidFill>
+                <a:srgbClr val="000000"/>
+              </a:solidFill>
+              <a:effectLst/>
+              <a:latin typeface="Arial"/>
+              <a:cs typeface="Arial"/>
+            </a:endParaRPr>
+          </a:p>
+        </p:txBody>
+      </p:sp>
+      <p:sp>
+        <p:nvSpPr>
+          <p:cNvPr id="26" name="Process 25"/>
+          <p:cNvSpPr/>
+          <p:nvPr/>
+        </p:nvSpPr>
+        <p:spPr>
+          <a:xfrm>
+            <a:off x="6417375" y="2155345"/>
+            <a:ext cx="2321107" cy="407873"/>
+          </a:xfrm>
+          <a:prstGeom prst="flowChartProcess">
+            <a:avLst/>
+          </a:prstGeom>
+          <a:noFill/>
+          <a:ln>
+            <a:solidFill>
+              <a:schemeClr val="tx1"/>
+            </a:solidFill>
+          </a:ln>
+          <a:effectLst/>
+        </p:spPr>
+        <p:style>
+          <a:lnRef idx="1">
+            <a:schemeClr val="accent1"/>
+          </a:lnRef>
+          <a:fillRef idx="3">
+            <a:schemeClr val="accent1"/>
+          </a:fillRef>
+          <a:effectRef idx="2">
+            <a:schemeClr val="accent1"/>
+          </a:effectRef>
+          <a:fontRef idx="minor">
+            <a:schemeClr val="lt1"/>
+          </a:fontRef>
+        </p:style>
+        <p:txBody>
+          <a:bodyPr rtlCol="0" anchor="ctr"/>
+          <a:lstStyle/>
+          <a:p>
+            <a:r>
+              <a:rPr lang="en-US" sz="1300" dirty="0" smtClean="0">
+                <a:solidFill>
+                  <a:srgbClr val="000000"/>
+                </a:solidFill>
+                <a:effectLst/>
+                <a:latin typeface="Arial"/>
+                <a:cs typeface="Arial"/>
+              </a:rPr>
+              <a:t>Trained students in technology &amp; biodiversity</a:t>
+            </a:r>
+            <a:endParaRPr lang="en-US" sz="1300" dirty="0">
+              <a:solidFill>
+                <a:srgbClr val="000000"/>
+              </a:solidFill>
+              <a:effectLst/>
+              <a:latin typeface="Arial"/>
+              <a:cs typeface="Arial"/>
+            </a:endParaRPr>
+          </a:p>
+        </p:txBody>
+      </p:sp>
+      <p:sp>
+        <p:nvSpPr>
+          <p:cNvPr id="28" name="Process 27"/>
+          <p:cNvSpPr/>
+          <p:nvPr/>
+        </p:nvSpPr>
+        <p:spPr>
+          <a:xfrm>
+            <a:off x="6417375" y="3523614"/>
+            <a:ext cx="2321107" cy="407873"/>
+          </a:xfrm>
+          <a:prstGeom prst="flowChartProcess">
+            <a:avLst/>
+          </a:prstGeom>
+          <a:noFill/>
+          <a:ln>
+            <a:solidFill>
+              <a:schemeClr val="tx1"/>
+            </a:solidFill>
+          </a:ln>
+          <a:effectLst/>
+        </p:spPr>
+        <p:style>
+          <a:lnRef idx="1">
+            <a:schemeClr val="accent1"/>
+          </a:lnRef>
+          <a:fillRef idx="3">
+            <a:schemeClr val="accent1"/>
+          </a:fillRef>
+          <a:effectRef idx="2">
+            <a:schemeClr val="accent1"/>
+          </a:effectRef>
+          <a:fontRef idx="minor">
+            <a:schemeClr val="lt1"/>
+          </a:fontRef>
+        </p:style>
+        <p:txBody>
+          <a:bodyPr rtlCol="0" anchor="ctr"/>
+          <a:lstStyle/>
+          <a:p>
+            <a:r>
+              <a:rPr lang="en-US" sz="1300" dirty="0" smtClean="0">
+                <a:solidFill>
+                  <a:srgbClr val="000000"/>
+                </a:solidFill>
+                <a:effectLst/>
+                <a:latin typeface="Arial"/>
+                <a:cs typeface="Arial"/>
+              </a:rPr>
+              <a:t>Broader pool of graduate students entering science</a:t>
+            </a:r>
+            <a:endParaRPr lang="en-US" sz="1300" dirty="0">
+              <a:solidFill>
+                <a:srgbClr val="000000"/>
+              </a:solidFill>
+              <a:effectLst/>
+              <a:latin typeface="Arial"/>
+              <a:cs typeface="Arial"/>
+            </a:endParaRPr>
+          </a:p>
+        </p:txBody>
+      </p:sp>
+      <p:cxnSp>
+        <p:nvCxnSpPr>
+          <p:cNvPr id="29" name="Curved Connector 28"/>
+          <p:cNvCxnSpPr>
+            <a:stCxn id="17" idx="3"/>
+            <a:endCxn id="16" idx="1"/>
+          </p:cNvCxnSpPr>
+          <p:nvPr/>
+        </p:nvCxnSpPr>
+        <p:spPr>
+          <a:xfrm>
+            <a:off x="2999840" y="4460110"/>
+            <a:ext cx="679146" cy="143798"/>
+          </a:xfrm>
+          <a:prstGeom prst="curvedConnector3">
+            <a:avLst>
+              <a:gd name="adj1" fmla="val 50000"/>
+            </a:avLst>
           </a:prstGeom>
           <a:ln>
             <a:solidFill>
@@ -3346,20 +4459,163 @@
       </p:cxnSp>
       <p:cxnSp>
         <p:nvCxnSpPr>
-          <p:cNvPr id="9" name="Curved Connector 8"/>
+          <p:cNvPr id="30" name="Curved Connector 29"/>
           <p:cNvCxnSpPr>
-            <a:stCxn id="3" idx="3"/>
-            <a:endCxn id="5" idx="1"/>
+            <a:stCxn id="2" idx="3"/>
+            <a:endCxn id="13" idx="1"/>
           </p:cNvCxnSpPr>
           <p:nvPr/>
         </p:nvCxnSpPr>
         <p:spPr>
+          <a:xfrm>
+            <a:off x="2999840" y="1244622"/>
+            <a:ext cx="679147" cy="2062273"/>
+          </a:xfrm>
+          <a:prstGeom prst="curvedConnector3">
+            <a:avLst>
+              <a:gd name="adj1" fmla="val 50000"/>
+            </a:avLst>
+          </a:prstGeom>
+          <a:ln>
+            <a:solidFill>
+              <a:srgbClr val="FF0000"/>
+            </a:solidFill>
+          </a:ln>
+          <a:effectLst>
+            <a:outerShdw blurRad="50800" dist="38100" dir="2700000" algn="tl" rotWithShape="0">
+              <a:prstClr val="black">
+                <a:alpha val="40000"/>
+              </a:prstClr>
+            </a:outerShdw>
+          </a:effectLst>
+        </p:spPr>
+        <p:style>
+          <a:lnRef idx="2">
+            <a:schemeClr val="accent1"/>
+          </a:lnRef>
+          <a:fillRef idx="0">
+            <a:schemeClr val="accent1"/>
+          </a:fillRef>
+          <a:effectRef idx="1">
+            <a:schemeClr val="accent1"/>
+          </a:effectRef>
+          <a:fontRef idx="minor">
+            <a:schemeClr val="tx1"/>
+          </a:fontRef>
+        </p:style>
+      </p:cxnSp>
+      <p:cxnSp>
+        <p:nvCxnSpPr>
+          <p:cNvPr id="31" name="Curved Connector 30"/>
+          <p:cNvCxnSpPr>
+            <a:stCxn id="18" idx="3"/>
+            <a:endCxn id="24" idx="1"/>
+          </p:cNvCxnSpPr>
+          <p:nvPr/>
+        </p:nvCxnSpPr>
+        <p:spPr>
           <a:xfrm flipV="1">
-            <a:off x="3165500" y="754349"/>
-            <a:ext cx="416854" cy="1191704"/>
+            <a:off x="2999840" y="1564726"/>
+            <a:ext cx="679146" cy="1322358"/>
           </a:xfrm>
           <a:prstGeom prst="curvedConnector3">
-            <a:avLst/>
+            <a:avLst>
+              <a:gd name="adj1" fmla="val 50000"/>
+            </a:avLst>
+          </a:prstGeom>
+          <a:ln>
+            <a:solidFill>
+              <a:srgbClr val="3366FF"/>
+            </a:solidFill>
+          </a:ln>
+          <a:effectLst>
+            <a:outerShdw blurRad="50800" dist="38100" dir="2700000" algn="tl" rotWithShape="0">
+              <a:prstClr val="black">
+                <a:alpha val="40000"/>
+              </a:prstClr>
+            </a:outerShdw>
+          </a:effectLst>
+        </p:spPr>
+        <p:style>
+          <a:lnRef idx="2">
+            <a:schemeClr val="accent1"/>
+          </a:lnRef>
+          <a:fillRef idx="0">
+            <a:schemeClr val="accent1"/>
+          </a:fillRef>
+          <a:effectRef idx="1">
+            <a:schemeClr val="accent1"/>
+          </a:effectRef>
+          <a:fontRef idx="minor">
+            <a:schemeClr val="tx1"/>
+          </a:fontRef>
+        </p:style>
+      </p:cxnSp>
+      <p:cxnSp>
+        <p:nvCxnSpPr>
+          <p:cNvPr id="33" name="Curved Connector 32"/>
+          <p:cNvCxnSpPr>
+            <a:stCxn id="2" idx="3"/>
+            <a:endCxn id="12" idx="1"/>
+          </p:cNvCxnSpPr>
+          <p:nvPr/>
+        </p:nvCxnSpPr>
+        <p:spPr>
+          <a:xfrm>
+            <a:off x="2999840" y="1244622"/>
+            <a:ext cx="679146" cy="1202662"/>
+          </a:xfrm>
+          <a:prstGeom prst="curvedConnector3">
+            <a:avLst>
+              <a:gd name="adj1" fmla="val 50000"/>
+            </a:avLst>
+          </a:prstGeom>
+          <a:ln>
+            <a:solidFill>
+              <a:srgbClr val="660066"/>
+            </a:solidFill>
+          </a:ln>
+          <a:effectLst>
+            <a:outerShdw blurRad="50800" dist="38100" dir="2700000" algn="tl" rotWithShape="0">
+              <a:prstClr val="black">
+                <a:alpha val="40000"/>
+              </a:prstClr>
+            </a:outerShdw>
+          </a:effectLst>
+        </p:spPr>
+        <p:style>
+          <a:lnRef idx="2">
+            <a:schemeClr val="accent1"/>
+          </a:lnRef>
+          <a:fillRef idx="0">
+            <a:schemeClr val="accent1"/>
+          </a:fillRef>
+          <a:effectRef idx="1">
+            <a:schemeClr val="accent1"/>
+          </a:effectRef>
+          <a:fontRef idx="minor">
+            <a:schemeClr val="tx1"/>
+          </a:fontRef>
+        </p:style>
+      </p:cxnSp>
+      <p:cxnSp>
+        <p:nvCxnSpPr>
+          <p:cNvPr id="36" name="Curved Connector 35"/>
+          <p:cNvCxnSpPr>
+            <a:stCxn id="23" idx="3"/>
+            <a:endCxn id="14" idx="1"/>
+          </p:cNvCxnSpPr>
+          <p:nvPr/>
+        </p:nvCxnSpPr>
+        <p:spPr>
+          <a:xfrm>
+            <a:off x="2999840" y="3632310"/>
+            <a:ext cx="679147" cy="360698"/>
+          </a:xfrm>
+          <a:prstGeom prst="curvedConnector3">
+            <a:avLst>
+              <a:gd name="adj1" fmla="val 50000"/>
+            </a:avLst>
           </a:prstGeom>
           <a:ln>
             <a:solidFill>
@@ -3389,299 +4645,447 @@
           </a:fontRef>
         </p:style>
       </p:cxnSp>
-      <p:sp>
-        <p:nvSpPr>
-          <p:cNvPr id="17" name="Process 16"/>
-          <p:cNvSpPr/>
-          <p:nvPr/>
-        </p:nvSpPr>
-        <p:spPr>
-          <a:xfrm>
-            <a:off x="438875" y="2359282"/>
-            <a:ext cx="2726625" cy="526331"/>
-          </a:xfrm>
-          <a:prstGeom prst="flowChartProcess">
-            <a:avLst/>
-          </a:prstGeom>
-          <a:noFill/>
-          <a:ln>
-            <a:solidFill>
-              <a:schemeClr val="tx1"/>
-            </a:solidFill>
-          </a:ln>
-          <a:effectLst/>
-        </p:spPr>
-        <p:style>
-          <a:lnRef idx="1">
-            <a:schemeClr val="accent1"/>
-          </a:lnRef>
-          <a:fillRef idx="3">
-            <a:schemeClr val="accent1"/>
-          </a:fillRef>
-          <a:effectRef idx="2">
-            <a:schemeClr val="accent1"/>
-          </a:effectRef>
-          <a:fontRef idx="minor">
-            <a:schemeClr val="lt1"/>
-          </a:fontRef>
-        </p:style>
-        <p:txBody>
-          <a:bodyPr rtlCol="0" anchor="ctr"/>
-          <a:lstStyle/>
-          <a:p>
-            <a:r>
-              <a:rPr lang="en-US" sz="1300" dirty="0" smtClean="0">
-                <a:solidFill>
-                  <a:srgbClr val="000000"/>
-                </a:solidFill>
-                <a:effectLst/>
-                <a:latin typeface="Arial"/>
-                <a:cs typeface="Arial"/>
-              </a:rPr>
-              <a:t>Lack of synergy between areas of study</a:t>
-            </a:r>
-            <a:endParaRPr lang="en-US" sz="1300" dirty="0">
-              <a:solidFill>
-                <a:srgbClr val="000000"/>
-              </a:solidFill>
-              <a:effectLst/>
-              <a:latin typeface="Arial"/>
-              <a:cs typeface="Arial"/>
-            </a:endParaRPr>
-          </a:p>
-        </p:txBody>
-      </p:sp>
-      <p:sp>
-        <p:nvSpPr>
-          <p:cNvPr id="18" name="Process 17"/>
-          <p:cNvSpPr/>
-          <p:nvPr/>
-        </p:nvSpPr>
-        <p:spPr>
-          <a:xfrm>
-            <a:off x="438875" y="3153060"/>
-            <a:ext cx="2726625" cy="647732"/>
-          </a:xfrm>
-          <a:prstGeom prst="flowChartProcess">
-            <a:avLst/>
-          </a:prstGeom>
-          <a:noFill/>
-          <a:ln>
-            <a:solidFill>
-              <a:schemeClr val="tx1"/>
-            </a:solidFill>
-          </a:ln>
-          <a:effectLst/>
-        </p:spPr>
-        <p:style>
-          <a:lnRef idx="1">
-            <a:schemeClr val="accent1"/>
-          </a:lnRef>
-          <a:fillRef idx="3">
-            <a:schemeClr val="accent1"/>
-          </a:fillRef>
-          <a:effectRef idx="2">
-            <a:schemeClr val="accent1"/>
-          </a:effectRef>
-          <a:fontRef idx="minor">
-            <a:schemeClr val="lt1"/>
-          </a:fontRef>
-        </p:style>
-        <p:txBody>
-          <a:bodyPr rtlCol="0" anchor="ctr"/>
-          <a:lstStyle/>
-          <a:p>
-            <a:r>
-              <a:rPr lang="en-US" sz="1300" dirty="0" smtClean="0">
-                <a:solidFill>
-                  <a:srgbClr val="000000"/>
-                </a:solidFill>
-                <a:effectLst/>
-                <a:latin typeface="Arial"/>
-                <a:cs typeface="Arial"/>
-              </a:rPr>
-              <a:t>Lack of training in new tools and technologies</a:t>
-            </a:r>
-            <a:endParaRPr lang="en-US" sz="1300" dirty="0">
-              <a:solidFill>
-                <a:srgbClr val="000000"/>
-              </a:solidFill>
-              <a:effectLst/>
-              <a:latin typeface="Arial"/>
-              <a:cs typeface="Arial"/>
-            </a:endParaRPr>
-          </a:p>
-        </p:txBody>
-      </p:sp>
-      <p:sp>
-        <p:nvSpPr>
-          <p:cNvPr id="23" name="Process 22"/>
-          <p:cNvSpPr/>
-          <p:nvPr/>
-        </p:nvSpPr>
-        <p:spPr>
-          <a:xfrm>
-            <a:off x="438875" y="3956176"/>
-            <a:ext cx="2726625" cy="647732"/>
-          </a:xfrm>
-          <a:prstGeom prst="flowChartProcess">
-            <a:avLst/>
-          </a:prstGeom>
-          <a:noFill/>
-          <a:ln>
-            <a:solidFill>
-              <a:schemeClr val="tx1"/>
-            </a:solidFill>
-          </a:ln>
-          <a:effectLst/>
-        </p:spPr>
-        <p:style>
-          <a:lnRef idx="1">
-            <a:schemeClr val="accent1"/>
-          </a:lnRef>
-          <a:fillRef idx="3">
-            <a:schemeClr val="accent1"/>
-          </a:fillRef>
-          <a:effectRef idx="2">
-            <a:schemeClr val="accent1"/>
-          </a:effectRef>
-          <a:fontRef idx="minor">
-            <a:schemeClr val="lt1"/>
-          </a:fontRef>
-        </p:style>
-        <p:txBody>
-          <a:bodyPr rtlCol="0" anchor="ctr"/>
-          <a:lstStyle/>
-          <a:p>
-            <a:r>
-              <a:rPr lang="en-US" sz="1300" dirty="0" smtClean="0">
-                <a:solidFill>
-                  <a:srgbClr val="000000"/>
-                </a:solidFill>
-                <a:effectLst/>
-                <a:latin typeface="Arial"/>
-                <a:cs typeface="Arial"/>
-              </a:rPr>
-              <a:t>Lack of diversity among graduate students</a:t>
-            </a:r>
-            <a:endParaRPr lang="en-US" sz="1300" dirty="0">
-              <a:solidFill>
-                <a:srgbClr val="000000"/>
-              </a:solidFill>
-              <a:effectLst/>
-              <a:latin typeface="Arial"/>
-              <a:cs typeface="Arial"/>
-            </a:endParaRPr>
-          </a:p>
-        </p:txBody>
-      </p:sp>
-      <p:sp>
-        <p:nvSpPr>
-          <p:cNvPr id="24" name="Process 23"/>
-          <p:cNvSpPr/>
-          <p:nvPr/>
-        </p:nvSpPr>
-        <p:spPr>
-          <a:xfrm>
-            <a:off x="3582354" y="1272896"/>
-            <a:ext cx="2726625" cy="583660"/>
-          </a:xfrm>
-          <a:prstGeom prst="flowChartProcess">
-            <a:avLst/>
-          </a:prstGeom>
-          <a:noFill/>
-          <a:ln>
-            <a:solidFill>
-              <a:schemeClr val="tx1"/>
-            </a:solidFill>
-          </a:ln>
-          <a:effectLst/>
-        </p:spPr>
-        <p:style>
-          <a:lnRef idx="1">
-            <a:schemeClr val="accent1"/>
-          </a:lnRef>
-          <a:fillRef idx="3">
-            <a:schemeClr val="accent1"/>
-          </a:fillRef>
-          <a:effectRef idx="2">
-            <a:schemeClr val="accent1"/>
-          </a:effectRef>
-          <a:fontRef idx="minor">
-            <a:schemeClr val="lt1"/>
-          </a:fontRef>
-        </p:style>
-        <p:txBody>
-          <a:bodyPr rtlCol="0" anchor="ctr"/>
-          <a:lstStyle/>
-          <a:p>
-            <a:r>
-              <a:rPr lang="en-US" sz="1300" dirty="0" smtClean="0">
-                <a:solidFill>
-                  <a:srgbClr val="000000"/>
-                </a:solidFill>
-                <a:effectLst/>
-                <a:latin typeface="Arial"/>
-                <a:cs typeface="Arial"/>
-              </a:rPr>
-              <a:t>Technology training</a:t>
-            </a:r>
-          </a:p>
-          <a:p>
-            <a:r>
-              <a:rPr lang="en-US" sz="1300" dirty="0" smtClean="0">
-                <a:solidFill>
-                  <a:srgbClr val="000000"/>
-                </a:solidFill>
-                <a:effectLst/>
-                <a:latin typeface="Arial"/>
-                <a:cs typeface="Arial"/>
-              </a:rPr>
-              <a:t>• Semester long courses</a:t>
-            </a:r>
-          </a:p>
-          <a:p>
-            <a:r>
-              <a:rPr lang="en-US" sz="1300" dirty="0" smtClean="0">
-                <a:solidFill>
-                  <a:srgbClr val="000000"/>
-                </a:solidFill>
-                <a:effectLst/>
-                <a:latin typeface="Arial"/>
-                <a:cs typeface="Arial"/>
-              </a:rPr>
-              <a:t>• Workshops</a:t>
-            </a:r>
-            <a:endParaRPr lang="en-US" sz="1300" dirty="0">
-              <a:solidFill>
-                <a:srgbClr val="000000"/>
-              </a:solidFill>
-              <a:effectLst/>
-              <a:latin typeface="Arial"/>
-              <a:cs typeface="Arial"/>
-            </a:endParaRPr>
-          </a:p>
-        </p:txBody>
-      </p:sp>
       <p:cxnSp>
         <p:nvCxnSpPr>
-          <p:cNvPr id="27" name="Curved Connector 26"/>
+          <p:cNvPr id="75" name="Curved Connector 74"/>
           <p:cNvCxnSpPr>
-            <a:stCxn id="2" idx="3"/>
+            <a:stCxn id="5" idx="3"/>
+            <a:endCxn id="20" idx="1"/>
           </p:cNvCxnSpPr>
           <p:nvPr/>
         </p:nvCxnSpPr>
         <p:spPr>
           <a:xfrm>
-            <a:off x="3165500" y="1244622"/>
-            <a:ext cx="416854" cy="320104"/>
+            <a:off x="5880874" y="754349"/>
+            <a:ext cx="536501" cy="247561"/>
           </a:xfrm>
           <a:prstGeom prst="curvedConnector3">
             <a:avLst/>
           </a:prstGeom>
           <a:ln>
             <a:solidFill>
+              <a:srgbClr val="008000"/>
+            </a:solidFill>
+          </a:ln>
+          <a:effectLst>
+            <a:outerShdw blurRad="50800" dist="38100" dir="2700000" algn="tl" rotWithShape="0">
+              <a:prstClr val="black">
+                <a:alpha val="40000"/>
+              </a:prstClr>
+            </a:outerShdw>
+          </a:effectLst>
+        </p:spPr>
+        <p:style>
+          <a:lnRef idx="2">
+            <a:schemeClr val="accent1"/>
+          </a:lnRef>
+          <a:fillRef idx="0">
+            <a:schemeClr val="accent1"/>
+          </a:fillRef>
+          <a:effectRef idx="1">
+            <a:schemeClr val="accent1"/>
+          </a:effectRef>
+          <a:fontRef idx="minor">
+            <a:schemeClr val="tx1"/>
+          </a:fontRef>
+        </p:style>
+      </p:cxnSp>
+      <p:cxnSp>
+        <p:nvCxnSpPr>
+          <p:cNvPr id="78" name="Curved Connector 77"/>
+          <p:cNvCxnSpPr>
+            <a:stCxn id="13" idx="3"/>
+            <a:endCxn id="21" idx="1"/>
+          </p:cNvCxnSpPr>
+          <p:nvPr/>
+        </p:nvCxnSpPr>
+        <p:spPr>
+          <a:xfrm flipV="1">
+            <a:off x="5880875" y="1671709"/>
+            <a:ext cx="536500" cy="1635186"/>
+          </a:xfrm>
+          <a:prstGeom prst="curvedConnector3">
+            <a:avLst>
+              <a:gd name="adj1" fmla="val 50000"/>
+            </a:avLst>
+          </a:prstGeom>
+          <a:ln>
+            <a:solidFill>
+              <a:srgbClr val="FF0000"/>
+            </a:solidFill>
+          </a:ln>
+          <a:effectLst>
+            <a:outerShdw blurRad="50800" dist="38100" dir="2700000" algn="tl" rotWithShape="0">
+              <a:prstClr val="black">
+                <a:alpha val="40000"/>
+              </a:prstClr>
+            </a:outerShdw>
+          </a:effectLst>
+        </p:spPr>
+        <p:style>
+          <a:lnRef idx="2">
+            <a:schemeClr val="accent1"/>
+          </a:lnRef>
+          <a:fillRef idx="0">
+            <a:schemeClr val="accent1"/>
+          </a:fillRef>
+          <a:effectRef idx="1">
+            <a:schemeClr val="accent1"/>
+          </a:effectRef>
+          <a:fontRef idx="minor">
+            <a:schemeClr val="tx1"/>
+          </a:fontRef>
+        </p:style>
+      </p:cxnSp>
+      <p:cxnSp>
+        <p:nvCxnSpPr>
+          <p:cNvPr id="82" name="Curved Connector 81"/>
+          <p:cNvCxnSpPr>
+            <a:stCxn id="14" idx="3"/>
+            <a:endCxn id="28" idx="1"/>
+          </p:cNvCxnSpPr>
+          <p:nvPr/>
+        </p:nvCxnSpPr>
+        <p:spPr>
+          <a:xfrm flipV="1">
+            <a:off x="5880875" y="3727551"/>
+            <a:ext cx="536500" cy="265457"/>
+          </a:xfrm>
+          <a:prstGeom prst="curvedConnector3">
+            <a:avLst>
+              <a:gd name="adj1" fmla="val 50000"/>
+            </a:avLst>
+          </a:prstGeom>
+          <a:ln>
+            <a:solidFill>
               <a:srgbClr val="000000"/>
+            </a:solidFill>
+          </a:ln>
+          <a:effectLst>
+            <a:outerShdw blurRad="50800" dist="38100" dir="2700000" algn="tl" rotWithShape="0">
+              <a:prstClr val="black">
+                <a:alpha val="40000"/>
+              </a:prstClr>
+            </a:outerShdw>
+          </a:effectLst>
+        </p:spPr>
+        <p:style>
+          <a:lnRef idx="2">
+            <a:schemeClr val="accent1"/>
+          </a:lnRef>
+          <a:fillRef idx="0">
+            <a:schemeClr val="accent1"/>
+          </a:fillRef>
+          <a:effectRef idx="1">
+            <a:schemeClr val="accent1"/>
+          </a:effectRef>
+          <a:fontRef idx="minor">
+            <a:schemeClr val="tx1"/>
+          </a:fontRef>
+        </p:style>
+      </p:cxnSp>
+      <p:cxnSp>
+        <p:nvCxnSpPr>
+          <p:cNvPr id="85" name="Curved Connector 84"/>
+          <p:cNvCxnSpPr>
+            <a:stCxn id="24" idx="3"/>
+            <a:endCxn id="21" idx="1"/>
+          </p:cNvCxnSpPr>
+          <p:nvPr/>
+        </p:nvCxnSpPr>
+        <p:spPr>
+          <a:xfrm>
+            <a:off x="5880874" y="1564726"/>
+            <a:ext cx="536501" cy="106983"/>
+          </a:xfrm>
+          <a:prstGeom prst="curvedConnector3">
+            <a:avLst/>
+          </a:prstGeom>
+          <a:ln>
+            <a:solidFill>
+              <a:srgbClr val="3366FF"/>
+            </a:solidFill>
+          </a:ln>
+          <a:effectLst>
+            <a:outerShdw blurRad="50800" dist="38100" dir="2700000" algn="tl" rotWithShape="0">
+              <a:prstClr val="black">
+                <a:alpha val="40000"/>
+              </a:prstClr>
+            </a:outerShdw>
+          </a:effectLst>
+        </p:spPr>
+        <p:style>
+          <a:lnRef idx="2">
+            <a:schemeClr val="accent1"/>
+          </a:lnRef>
+          <a:fillRef idx="0">
+            <a:schemeClr val="accent1"/>
+          </a:fillRef>
+          <a:effectRef idx="1">
+            <a:schemeClr val="accent1"/>
+          </a:effectRef>
+          <a:fontRef idx="minor">
+            <a:schemeClr val="tx1"/>
+          </a:fontRef>
+        </p:style>
+      </p:cxnSp>
+      <p:cxnSp>
+        <p:nvCxnSpPr>
+          <p:cNvPr id="88" name="Curved Connector 87"/>
+          <p:cNvCxnSpPr>
+            <a:stCxn id="5" idx="3"/>
+            <a:endCxn id="21" idx="1"/>
+          </p:cNvCxnSpPr>
+          <p:nvPr/>
+        </p:nvCxnSpPr>
+        <p:spPr>
+          <a:xfrm>
+            <a:off x="5880874" y="754349"/>
+            <a:ext cx="536501" cy="917360"/>
+          </a:xfrm>
+          <a:prstGeom prst="curvedConnector3">
+            <a:avLst>
+              <a:gd name="adj1" fmla="val 50000"/>
+            </a:avLst>
+          </a:prstGeom>
+          <a:ln>
+            <a:solidFill>
+              <a:srgbClr val="008000"/>
+            </a:solidFill>
+          </a:ln>
+          <a:effectLst>
+            <a:outerShdw blurRad="50800" dist="38100" dir="2700000" algn="tl" rotWithShape="0">
+              <a:prstClr val="black">
+                <a:alpha val="40000"/>
+              </a:prstClr>
+            </a:outerShdw>
+          </a:effectLst>
+        </p:spPr>
+        <p:style>
+          <a:lnRef idx="2">
+            <a:schemeClr val="accent1"/>
+          </a:lnRef>
+          <a:fillRef idx="0">
+            <a:schemeClr val="accent1"/>
+          </a:fillRef>
+          <a:effectRef idx="1">
+            <a:schemeClr val="accent1"/>
+          </a:effectRef>
+          <a:fontRef idx="minor">
+            <a:schemeClr val="tx1"/>
+          </a:fontRef>
+        </p:style>
+      </p:cxnSp>
+      <p:cxnSp>
+        <p:nvCxnSpPr>
+          <p:cNvPr id="91" name="Curved Connector 90"/>
+          <p:cNvCxnSpPr>
+            <a:stCxn id="12" idx="3"/>
+            <a:endCxn id="22" idx="1"/>
+          </p:cNvCxnSpPr>
+          <p:nvPr/>
+        </p:nvCxnSpPr>
+        <p:spPr>
+          <a:xfrm>
+            <a:off x="5880874" y="2447284"/>
+            <a:ext cx="536501" cy="555081"/>
+          </a:xfrm>
+          <a:prstGeom prst="curvedConnector3">
+            <a:avLst>
+              <a:gd name="adj1" fmla="val 50000"/>
+            </a:avLst>
+          </a:prstGeom>
+          <a:ln>
+            <a:solidFill>
+              <a:srgbClr val="660066"/>
+            </a:solidFill>
+          </a:ln>
+          <a:effectLst>
+            <a:outerShdw blurRad="50800" dist="38100" dir="2700000" algn="tl" rotWithShape="0">
+              <a:prstClr val="black">
+                <a:alpha val="40000"/>
+              </a:prstClr>
+            </a:outerShdw>
+          </a:effectLst>
+        </p:spPr>
+        <p:style>
+          <a:lnRef idx="2">
+            <a:schemeClr val="accent1"/>
+          </a:lnRef>
+          <a:fillRef idx="0">
+            <a:schemeClr val="accent1"/>
+          </a:fillRef>
+          <a:effectRef idx="1">
+            <a:schemeClr val="accent1"/>
+          </a:effectRef>
+          <a:fontRef idx="minor">
+            <a:schemeClr val="tx1"/>
+          </a:fontRef>
+        </p:style>
+      </p:cxnSp>
+      <p:cxnSp>
+        <p:nvCxnSpPr>
+          <p:cNvPr id="94" name="Curved Connector 93"/>
+          <p:cNvCxnSpPr>
+            <a:stCxn id="13" idx="3"/>
+            <a:endCxn id="22" idx="1"/>
+          </p:cNvCxnSpPr>
+          <p:nvPr/>
+        </p:nvCxnSpPr>
+        <p:spPr>
+          <a:xfrm flipV="1">
+            <a:off x="5880875" y="3002365"/>
+            <a:ext cx="536500" cy="304530"/>
+          </a:xfrm>
+          <a:prstGeom prst="curvedConnector3">
+            <a:avLst>
+              <a:gd name="adj1" fmla="val 50000"/>
+            </a:avLst>
+          </a:prstGeom>
+          <a:ln>
+            <a:solidFill>
+              <a:srgbClr val="FF0000"/>
+            </a:solidFill>
+          </a:ln>
+          <a:effectLst>
+            <a:outerShdw blurRad="50800" dist="38100" dir="2700000" algn="tl" rotWithShape="0">
+              <a:prstClr val="black">
+                <a:alpha val="40000"/>
+              </a:prstClr>
+            </a:outerShdw>
+          </a:effectLst>
+        </p:spPr>
+        <p:style>
+          <a:lnRef idx="2">
+            <a:schemeClr val="accent1"/>
+          </a:lnRef>
+          <a:fillRef idx="0">
+            <a:schemeClr val="accent1"/>
+          </a:fillRef>
+          <a:effectRef idx="1">
+            <a:schemeClr val="accent1"/>
+          </a:effectRef>
+          <a:fontRef idx="minor">
+            <a:schemeClr val="tx1"/>
+          </a:fontRef>
+        </p:style>
+      </p:cxnSp>
+      <p:cxnSp>
+        <p:nvCxnSpPr>
+          <p:cNvPr id="98" name="Curved Connector 97"/>
+          <p:cNvCxnSpPr>
+            <a:stCxn id="16" idx="3"/>
+            <a:endCxn id="25" idx="1"/>
+          </p:cNvCxnSpPr>
+          <p:nvPr/>
+        </p:nvCxnSpPr>
+        <p:spPr>
+          <a:xfrm flipV="1">
+            <a:off x="5880875" y="4400881"/>
+            <a:ext cx="536500" cy="203027"/>
+          </a:xfrm>
+          <a:prstGeom prst="curvedConnector3">
+            <a:avLst>
+              <a:gd name="adj1" fmla="val 50000"/>
+            </a:avLst>
+          </a:prstGeom>
+          <a:ln>
+            <a:solidFill>
+              <a:srgbClr val="000000"/>
+            </a:solidFill>
+          </a:ln>
+          <a:effectLst>
+            <a:outerShdw blurRad="50800" dist="38100" dir="2700000" algn="tl" rotWithShape="0">
+              <a:prstClr val="black">
+                <a:alpha val="40000"/>
+              </a:prstClr>
+            </a:outerShdw>
+          </a:effectLst>
+        </p:spPr>
+        <p:style>
+          <a:lnRef idx="2">
+            <a:schemeClr val="accent1"/>
+          </a:lnRef>
+          <a:fillRef idx="0">
+            <a:schemeClr val="accent1"/>
+          </a:fillRef>
+          <a:effectRef idx="1">
+            <a:schemeClr val="accent1"/>
+          </a:effectRef>
+          <a:fontRef idx="minor">
+            <a:schemeClr val="tx1"/>
+          </a:fontRef>
+        </p:style>
+      </p:cxnSp>
+      <p:cxnSp>
+        <p:nvCxnSpPr>
+          <p:cNvPr id="110" name="Curved Connector 109"/>
+          <p:cNvCxnSpPr>
+            <a:stCxn id="5" idx="3"/>
+            <a:endCxn id="26" idx="1"/>
+          </p:cNvCxnSpPr>
+          <p:nvPr/>
+        </p:nvCxnSpPr>
+        <p:spPr>
+          <a:xfrm>
+            <a:off x="5880874" y="754349"/>
+            <a:ext cx="536501" cy="1604933"/>
+          </a:xfrm>
+          <a:prstGeom prst="curvedConnector3">
+            <a:avLst>
+              <a:gd name="adj1" fmla="val 50000"/>
+            </a:avLst>
+          </a:prstGeom>
+          <a:ln>
+            <a:solidFill>
+              <a:srgbClr val="008000"/>
+            </a:solidFill>
+          </a:ln>
+          <a:effectLst>
+            <a:outerShdw blurRad="50800" dist="38100" dir="2700000" algn="tl" rotWithShape="0">
+              <a:prstClr val="black">
+                <a:alpha val="40000"/>
+              </a:prstClr>
+            </a:outerShdw>
+          </a:effectLst>
+        </p:spPr>
+        <p:style>
+          <a:lnRef idx="2">
+            <a:schemeClr val="accent1"/>
+          </a:lnRef>
+          <a:fillRef idx="0">
+            <a:schemeClr val="accent1"/>
+          </a:fillRef>
+          <a:effectRef idx="1">
+            <a:schemeClr val="accent1"/>
+          </a:effectRef>
+          <a:fontRef idx="minor">
+            <a:schemeClr val="tx1"/>
+          </a:fontRef>
+        </p:style>
+      </p:cxnSp>
+      <p:cxnSp>
+        <p:nvCxnSpPr>
+          <p:cNvPr id="113" name="Curved Connector 112"/>
+          <p:cNvCxnSpPr>
+            <a:stCxn id="24" idx="3"/>
+            <a:endCxn id="26" idx="1"/>
+          </p:cNvCxnSpPr>
+          <p:nvPr/>
+        </p:nvCxnSpPr>
+        <p:spPr>
+          <a:xfrm>
+            <a:off x="5880874" y="1564726"/>
+            <a:ext cx="536501" cy="794556"/>
+          </a:xfrm>
+          <a:prstGeom prst="curvedConnector3">
+            <a:avLst>
+              <a:gd name="adj1" fmla="val 50000"/>
+            </a:avLst>
+          </a:prstGeom>
+          <a:ln>
+            <a:solidFill>
+              <a:srgbClr val="3366FF"/>
             </a:solidFill>
           </a:ln>
           <a:effectLst>

</xml_diff>